<commit_message>
beautifying code, modified .mwb date_time
</commit_message>
<xml_diff>
--- a/Traveller Online.pptx
+++ b/Traveller Online.pptx
@@ -11,6 +11,8 @@
     <p:sldId id="259" r:id="rId5"/>
     <p:sldId id="260" r:id="rId6"/>
     <p:sldId id="261" r:id="rId7"/>
+    <p:sldId id="263" r:id="rId8"/>
+    <p:sldId id="262" r:id="rId9"/>
   </p:sldIdLst>
   <p:sldSz cx="12192000" cy="6858000"/>
   <p:notesSz cx="6858000" cy="9144000"/>
@@ -109,6 +111,11 @@
       </a:defRPr>
     </a:lvl9pPr>
   </p:defaultTextStyle>
+  <p:extLst>
+    <p:ext uri="{EFAFB233-063F-42B5-8137-9DF3F51BA10A}">
+      <p15:sldGuideLst xmlns:p15="http://schemas.microsoft.com/office/powerpoint/2012/main"/>
+    </p:ext>
+  </p:extLst>
 </p:presentation>
 </file>
 
@@ -5885,6 +5892,13 @@
   <p:clrMapOvr>
     <a:masterClrMapping/>
   </p:clrMapOvr>
+  <p:timing>
+    <p:tnLst>
+      <p:par>
+        <p:cTn id="1" dur="indefinite" restart="never" nodeType="tmRoot"/>
+      </p:par>
+    </p:tnLst>
+  </p:timing>
 </p:sld>
 </file>
 
@@ -5963,6 +5977,13 @@
   <p:clrMapOvr>
     <a:masterClrMapping/>
   </p:clrMapOvr>
+  <p:timing>
+    <p:tnLst>
+      <p:par>
+        <p:cTn id="1" dur="indefinite" restart="never" nodeType="tmRoot"/>
+      </p:par>
+    </p:tnLst>
+  </p:timing>
 </p:sld>
 </file>
 
@@ -6041,6 +6062,13 @@
   <p:clrMapOvr>
     <a:masterClrMapping/>
   </p:clrMapOvr>
+  <p:timing>
+    <p:tnLst>
+      <p:par>
+        <p:cTn id="1" dur="indefinite" restart="never" nodeType="tmRoot"/>
+      </p:par>
+    </p:tnLst>
+  </p:timing>
 </p:sld>
 </file>
 
@@ -6197,6 +6225,13 @@
   <p:clrMapOvr>
     <a:masterClrMapping/>
   </p:clrMapOvr>
+  <p:timing>
+    <p:tnLst>
+      <p:par>
+        <p:cTn id="1" dur="indefinite" restart="never" nodeType="tmRoot"/>
+      </p:par>
+    </p:tnLst>
+  </p:timing>
 </p:sld>
 </file>
 
@@ -6305,6 +6340,13 @@
   <p:clrMapOvr>
     <a:masterClrMapping/>
   </p:clrMapOvr>
+  <p:timing>
+    <p:tnLst>
+      <p:par>
+        <p:cTn id="1" dur="indefinite" restart="never" nodeType="tmRoot"/>
+      </p:par>
+    </p:tnLst>
+  </p:timing>
 </p:sld>
 </file>
 
@@ -6443,6 +6485,183 @@
   <p:clrMapOvr>
     <a:masterClrMapping/>
   </p:clrMapOvr>
+  <p:timing>
+    <p:tnLst>
+      <p:par>
+        <p:cTn id="1" dur="indefinite" restart="never" nodeType="tmRoot"/>
+      </p:par>
+    </p:tnLst>
+  </p:timing>
+</p:sld>
+</file>
+
+<file path=ppt/slides/slide7.xml><?xml version="1.0" encoding="utf-8"?>
+<p:sld xmlns:a="http://schemas.openxmlformats.org/drawingml/2006/main" xmlns:r="http://schemas.openxmlformats.org/officeDocument/2006/relationships" xmlns:p="http://schemas.openxmlformats.org/presentationml/2006/main">
+  <p:cSld>
+    <p:spTree>
+      <p:nvGrpSpPr>
+        <p:cNvPr id="1" name=""/>
+        <p:cNvGrpSpPr/>
+        <p:nvPr/>
+      </p:nvGrpSpPr>
+      <p:grpSpPr>
+        <a:xfrm>
+          <a:off x="0" y="0"/>
+          <a:ext cx="0" cy="0"/>
+          <a:chOff x="0" y="0"/>
+          <a:chExt cx="0" cy="0"/>
+        </a:xfrm>
+      </p:grpSpPr>
+      <p:sp>
+        <p:nvSpPr>
+          <p:cNvPr id="2" name="Title 1"/>
+          <p:cNvSpPr>
+            <a:spLocks noGrp="1"/>
+          </p:cNvSpPr>
+          <p:nvPr>
+            <p:ph type="title"/>
+          </p:nvPr>
+        </p:nvSpPr>
+        <p:spPr>
+          <a:xfrm>
+            <a:off x="831850" y="525707"/>
+            <a:ext cx="10515600" cy="2852737"/>
+          </a:xfrm>
+        </p:spPr>
+        <p:txBody>
+          <a:bodyPr/>
+          <a:lstStyle/>
+          <a:p>
+            <a:pPr algn="ctr"/>
+            <a:r>
+              <a:rPr lang="en-US" dirty="0" smtClean="0"/>
+              <a:t>Let’s get started!</a:t>
+            </a:r>
+            <a:endParaRPr lang="en-US" dirty="0"/>
+          </a:p>
+        </p:txBody>
+      </p:sp>
+      <p:sp>
+        <p:nvSpPr>
+          <p:cNvPr id="3" name="Text Placeholder 2"/>
+          <p:cNvSpPr>
+            <a:spLocks noGrp="1"/>
+          </p:cNvSpPr>
+          <p:nvPr>
+            <p:ph type="body" idx="1"/>
+          </p:nvPr>
+        </p:nvSpPr>
+        <p:spPr/>
+        <p:txBody>
+          <a:bodyPr/>
+          <a:lstStyle/>
+          <a:p>
+            <a:endParaRPr lang="en-US"/>
+          </a:p>
+        </p:txBody>
+      </p:sp>
+    </p:spTree>
+    <p:extLst>
+      <p:ext uri="{BB962C8B-B14F-4D97-AF65-F5344CB8AC3E}">
+        <p14:creationId xmlns:p14="http://schemas.microsoft.com/office/powerpoint/2010/main" val="3331141545"/>
+      </p:ext>
+    </p:extLst>
+  </p:cSld>
+  <p:clrMapOvr>
+    <a:masterClrMapping/>
+  </p:clrMapOvr>
+  <p:timing>
+    <p:tnLst>
+      <p:par>
+        <p:cTn id="1" dur="indefinite" restart="never" nodeType="tmRoot"/>
+      </p:par>
+    </p:tnLst>
+  </p:timing>
+</p:sld>
+</file>
+
+<file path=ppt/slides/slide8.xml><?xml version="1.0" encoding="utf-8"?>
+<p:sld xmlns:a="http://schemas.openxmlformats.org/drawingml/2006/main" xmlns:r="http://schemas.openxmlformats.org/officeDocument/2006/relationships" xmlns:p="http://schemas.openxmlformats.org/presentationml/2006/main">
+  <p:cSld>
+    <p:spTree>
+      <p:nvGrpSpPr>
+        <p:cNvPr id="1" name=""/>
+        <p:cNvGrpSpPr/>
+        <p:nvPr/>
+      </p:nvGrpSpPr>
+      <p:grpSpPr>
+        <a:xfrm>
+          <a:off x="0" y="0"/>
+          <a:ext cx="0" cy="0"/>
+          <a:chOff x="0" y="0"/>
+          <a:chExt cx="0" cy="0"/>
+        </a:xfrm>
+      </p:grpSpPr>
+      <p:sp>
+        <p:nvSpPr>
+          <p:cNvPr id="2" name="Title 1"/>
+          <p:cNvSpPr>
+            <a:spLocks noGrp="1"/>
+          </p:cNvSpPr>
+          <p:nvPr>
+            <p:ph type="title"/>
+          </p:nvPr>
+        </p:nvSpPr>
+        <p:spPr>
+          <a:xfrm>
+            <a:off x="831850" y="525707"/>
+            <a:ext cx="10515600" cy="2852737"/>
+          </a:xfrm>
+        </p:spPr>
+        <p:txBody>
+          <a:bodyPr/>
+          <a:lstStyle/>
+          <a:p>
+            <a:pPr algn="ctr"/>
+            <a:r>
+              <a:rPr lang="en-US" dirty="0" smtClean="0"/>
+              <a:t>Any questions?</a:t>
+            </a:r>
+            <a:endParaRPr lang="en-US" dirty="0"/>
+          </a:p>
+        </p:txBody>
+      </p:sp>
+      <p:sp>
+        <p:nvSpPr>
+          <p:cNvPr id="3" name="Text Placeholder 2"/>
+          <p:cNvSpPr>
+            <a:spLocks noGrp="1"/>
+          </p:cNvSpPr>
+          <p:nvPr>
+            <p:ph type="body" idx="1"/>
+          </p:nvPr>
+        </p:nvSpPr>
+        <p:spPr/>
+        <p:txBody>
+          <a:bodyPr/>
+          <a:lstStyle/>
+          <a:p>
+            <a:endParaRPr lang="en-US"/>
+          </a:p>
+        </p:txBody>
+      </p:sp>
+    </p:spTree>
+    <p:extLst>
+      <p:ext uri="{BB962C8B-B14F-4D97-AF65-F5344CB8AC3E}">
+        <p14:creationId xmlns:p14="http://schemas.microsoft.com/office/powerpoint/2010/main" val="2576511332"/>
+      </p:ext>
+    </p:extLst>
+  </p:cSld>
+  <p:clrMapOvr>
+    <a:masterClrMapping/>
+  </p:clrMapOvr>
+  <p:timing>
+    <p:tnLst>
+      <p:par>
+        <p:cTn id="1" dur="indefinite" restart="never" nodeType="tmRoot"/>
+      </p:par>
+    </p:tnLst>
+  </p:timing>
 </p:sld>
 </file>
 

</xml_diff>